<commit_message>
Actualización del archivo presentacionSanchez
</commit_message>
<xml_diff>
--- a/presentacionSanchez.pptx
+++ b/presentacionSanchez.pptx
@@ -6,12 +6,14 @@
   </p:sldMasterIdLst>
   <p:sldIdLst>
     <p:sldId id="256" r:id="rId2"/>
-    <p:sldId id="257" r:id="rId3"/>
-    <p:sldId id="258" r:id="rId4"/>
+    <p:sldId id="258" r:id="rId3"/>
+    <p:sldId id="257" r:id="rId4"/>
     <p:sldId id="259" r:id="rId5"/>
     <p:sldId id="260" r:id="rId6"/>
-    <p:sldId id="261" r:id="rId7"/>
-    <p:sldId id="262" r:id="rId8"/>
+    <p:sldId id="263" r:id="rId7"/>
+    <p:sldId id="264" r:id="rId8"/>
+    <p:sldId id="261" r:id="rId9"/>
+    <p:sldId id="262" r:id="rId10"/>
   </p:sldIdLst>
   <p:sldSz cx="12192000" cy="6858000"/>
   <p:notesSz cx="6858000" cy="9144000"/>
@@ -116,15 +118,20 @@
         <p14:section name="IMAGEN" id="{26DBAFEF-64F0-472F-A0CD-C0F4FC3210EE}">
           <p14:sldIdLst>
             <p14:sldId id="256"/>
+            <p14:sldId id="258"/>
             <p14:sldId id="257"/>
-            <p14:sldId id="258"/>
             <p14:sldId id="259"/>
             <p14:sldId id="260"/>
+            <p14:sldId id="263"/>
+            <p14:sldId id="264"/>
             <p14:sldId id="261"/>
             <p14:sldId id="262"/>
           </p14:sldIdLst>
         </p14:section>
       </p14:sectionLst>
+    </p:ext>
+    <p:ext uri="{EFAFB233-063F-42B5-8137-9DF3F51BA10A}">
+      <p15:sldGuideLst xmlns:p15="http://schemas.microsoft.com/office/powerpoint/2012/main"/>
     </p:ext>
   </p:extLst>
 </p:presentation>
@@ -225,7 +232,7 @@
           <a:effectLst/>
           <a:extLst>
             <a:ext uri="{91240B29-F687-4f45-9708-019B960494DF}">
-              <a14:hiddenLine xmlns:a14="http://schemas.microsoft.com/office/drawing/2010/main" xmlns="" w="9525">
+              <a14:hiddenLine xmlns="" xmlns:a14="http://schemas.microsoft.com/office/drawing/2010/main" w="9525">
                 <a:solidFill>
                   <a:srgbClr val="000000"/>
                 </a:solidFill>
@@ -418,7 +425,7 @@
             <a:fld id="{08B9EBBA-996F-894A-B54A-D6246ED52CEA}" type="datetimeFigureOut">
               <a:rPr lang="en-US" dirty="0"/>
               <a:pPr/>
-              <a:t>6/10/2021</a:t>
+              <a:t>6/15/2021</a:t>
             </a:fld>
             <a:endParaRPr lang="en-US" dirty="0"/>
           </a:p>
@@ -733,7 +740,7 @@
             <a:fld id="{18C79C5D-2A6F-F04D-97DA-BEF2467B64E4}" type="datetimeFigureOut">
               <a:rPr lang="en-US" dirty="0"/>
               <a:pPr/>
-              <a:t>6/10/2021</a:t>
+              <a:t>6/15/2021</a:t>
             </a:fld>
             <a:endParaRPr lang="en-US" dirty="0"/>
           </a:p>
@@ -1218,7 +1225,7 @@
             <a:fld id="{8DFA1846-DA80-1C48-A609-854EA85C59AD}" type="datetimeFigureOut">
               <a:rPr lang="en-US" dirty="0"/>
               <a:pPr/>
-              <a:t>6/10/2021</a:t>
+              <a:t>6/15/2021</a:t>
             </a:fld>
             <a:endParaRPr lang="en-US" dirty="0"/>
           </a:p>
@@ -1584,7 +1591,7 @@
             <a:fld id="{FBF54567-0DE4-3F47-BF90-CB84690072F9}" type="datetimeFigureOut">
               <a:rPr lang="en-US" dirty="0"/>
               <a:pPr/>
-              <a:t>6/10/2021</a:t>
+              <a:t>6/15/2021</a:t>
             </a:fld>
             <a:endParaRPr lang="en-US" dirty="0"/>
           </a:p>
@@ -1735,7 +1742,7 @@
           <a:ln/>
           <a:extLst>
             <a:ext uri="{91240B29-F687-4f45-9708-019B960494DF}">
-              <a14:hiddenLine xmlns:a14="http://schemas.microsoft.com/office/drawing/2010/main" xmlns="" w="9525">
+              <a14:hiddenLine xmlns="" xmlns:a14="http://schemas.microsoft.com/office/drawing/2010/main" w="9525">
                 <a:solidFill>
                   <a:srgbClr val="000000"/>
                 </a:solidFill>
@@ -1854,7 +1861,7 @@
             <a:fld id="{C6C52C72-DE31-F449-A4ED-4C594FD91407}" type="datetimeFigureOut">
               <a:rPr lang="en-US" dirty="0"/>
               <a:pPr/>
-              <a:t>6/10/2021</a:t>
+              <a:t>6/15/2021</a:t>
             </a:fld>
             <a:endParaRPr lang="en-US" dirty="0"/>
           </a:p>
@@ -2007,7 +2014,7 @@
           <a:ln/>
           <a:extLst>
             <a:ext uri="{91240B29-F687-4f45-9708-019B960494DF}">
-              <a14:hiddenLine xmlns:a14="http://schemas.microsoft.com/office/drawing/2010/main" xmlns="" w="9525">
+              <a14:hiddenLine xmlns="" xmlns:a14="http://schemas.microsoft.com/office/drawing/2010/main" w="9525">
                 <a:solidFill>
                   <a:srgbClr val="000000"/>
                 </a:solidFill>
@@ -2136,7 +2143,7 @@
             <a:fld id="{ED62726E-379B-B349-9EED-81ED093FA806}" type="datetimeFigureOut">
               <a:rPr lang="en-US" dirty="0"/>
               <a:pPr/>
-              <a:t>6/10/2021</a:t>
+              <a:t>6/15/2021</a:t>
             </a:fld>
             <a:endParaRPr lang="en-US" dirty="0"/>
           </a:p>
@@ -2287,7 +2294,7 @@
           <a:ln/>
           <a:extLst>
             <a:ext uri="{91240B29-F687-4f45-9708-019B960494DF}">
-              <a14:hiddenLine xmlns:a14="http://schemas.microsoft.com/office/drawing/2010/main" xmlns="" w="9525">
+              <a14:hiddenLine xmlns="" xmlns:a14="http://schemas.microsoft.com/office/drawing/2010/main" w="9525">
                 <a:solidFill>
                   <a:srgbClr val="000000"/>
                 </a:solidFill>
@@ -2416,7 +2423,7 @@
             <a:fld id="{9B3A1323-8D79-1946-B0D7-40001CF92E9D}" type="datetimeFigureOut">
               <a:rPr lang="en-US" dirty="0"/>
               <a:pPr/>
-              <a:t>6/10/2021</a:t>
+              <a:t>6/15/2021</a:t>
             </a:fld>
             <a:endParaRPr lang="en-US" dirty="0"/>
           </a:p>
@@ -2756,7 +2763,7 @@
             <a:fld id="{8DFA1846-DA80-1C48-A609-854EA85C59AD}" type="datetimeFigureOut">
               <a:rPr lang="en-US" dirty="0"/>
               <a:pPr/>
-              <a:t>6/10/2021</a:t>
+              <a:t>6/15/2021</a:t>
             </a:fld>
             <a:endParaRPr lang="en-US" dirty="0"/>
           </a:p>
@@ -2907,7 +2914,7 @@
           <a:ln/>
           <a:extLst>
             <a:ext uri="{91240B29-F687-4f45-9708-019B960494DF}">
-              <a14:hiddenLine xmlns:a14="http://schemas.microsoft.com/office/drawing/2010/main" xmlns="" w="9525">
+              <a14:hiddenLine xmlns="" xmlns:a14="http://schemas.microsoft.com/office/drawing/2010/main" w="9525">
                 <a:solidFill>
                   <a:srgbClr val="000000"/>
                 </a:solidFill>
@@ -3092,7 +3099,7 @@
             <a:fld id="{57302355-E14B-8545-A8F8-0FE83CC9D524}" type="datetimeFigureOut">
               <a:rPr lang="en-US" dirty="0"/>
               <a:pPr/>
-              <a:t>6/10/2021</a:t>
+              <a:t>6/15/2021</a:t>
             </a:fld>
             <a:endParaRPr lang="en-US" dirty="0"/>
           </a:p>
@@ -3243,7 +3250,7 @@
           <a:ln/>
           <a:extLst>
             <a:ext uri="{91240B29-F687-4f45-9708-019B960494DF}">
-              <a14:hiddenLine xmlns:a14="http://schemas.microsoft.com/office/drawing/2010/main" xmlns="" w="9525">
+              <a14:hiddenLine xmlns="" xmlns:a14="http://schemas.microsoft.com/office/drawing/2010/main" w="9525">
                 <a:solidFill>
                   <a:srgbClr val="000000"/>
                 </a:solidFill>
@@ -3566,7 +3573,7 @@
             <a:fld id="{02640F58-564D-2B4F-AE67-E407BA4FCF45}" type="datetimeFigureOut">
               <a:rPr lang="en-US" dirty="0"/>
               <a:pPr/>
-              <a:t>6/10/2021</a:t>
+              <a:t>6/15/2021</a:t>
             </a:fld>
             <a:endParaRPr lang="en-US" dirty="0"/>
           </a:p>
@@ -3717,7 +3724,7 @@
           <a:ln/>
           <a:extLst>
             <a:ext uri="{91240B29-F687-4f45-9708-019B960494DF}">
-              <a14:hiddenLine xmlns:a14="http://schemas.microsoft.com/office/drawing/2010/main" xmlns="" w="9525">
+              <a14:hiddenLine xmlns="" xmlns:a14="http://schemas.microsoft.com/office/drawing/2010/main" w="9525">
                 <a:solidFill>
                   <a:srgbClr val="000000"/>
                 </a:solidFill>
@@ -3784,7 +3791,7 @@
             <a:fld id="{F13A34C8-038E-2045-AF43-DF7DBB8E0E9E}" type="datetimeFigureOut">
               <a:rPr lang="en-US" dirty="0"/>
               <a:pPr/>
-              <a:t>6/10/2021</a:t>
+              <a:t>6/15/2021</a:t>
             </a:fld>
             <a:endParaRPr lang="en-US" dirty="0"/>
           </a:p>
@@ -3876,7 +3883,7 @@
             <a:fld id="{8818C68F-D26B-8F47-958C-23B49CF8A634}" type="datetimeFigureOut">
               <a:rPr lang="en-US" dirty="0"/>
               <a:pPr/>
-              <a:t>6/10/2021</a:t>
+              <a:t>6/15/2021</a:t>
             </a:fld>
             <a:endParaRPr lang="en-US" dirty="0"/>
           </a:p>
@@ -4140,7 +4147,7 @@
           <a:ln/>
           <a:extLst>
             <a:ext uri="{91240B29-F687-4f45-9708-019B960494DF}">
-              <a14:hiddenLine xmlns:a14="http://schemas.microsoft.com/office/drawing/2010/main" xmlns="" w="9525">
+              <a14:hiddenLine xmlns="" xmlns:a14="http://schemas.microsoft.com/office/drawing/2010/main" w="9525">
                 <a:solidFill>
                   <a:srgbClr val="000000"/>
                 </a:solidFill>
@@ -4340,7 +4347,7 @@
             <a:fld id="{D0DF5E60-9974-AC48-9591-99C2BB44B7CF}" type="datetimeFigureOut">
               <a:rPr lang="en-US" dirty="0"/>
               <a:pPr/>
-              <a:t>6/10/2021</a:t>
+              <a:t>6/15/2021</a:t>
             </a:fld>
             <a:endParaRPr lang="en-US" dirty="0"/>
           </a:p>
@@ -4650,7 +4657,7 @@
             <a:fld id="{18C79C5D-2A6F-F04D-97DA-BEF2467B64E4}" type="datetimeFigureOut">
               <a:rPr lang="en-US" dirty="0"/>
               <a:pPr/>
-              <a:t>6/10/2021</a:t>
+              <a:t>6/15/2021</a:t>
             </a:fld>
             <a:endParaRPr lang="en-US" dirty="0"/>
           </a:p>
@@ -4917,7 +4924,7 @@
             <a:fld id="{09B482E8-6E0E-1B4F-B1FD-C69DB9E858D9}" type="datetimeFigureOut">
               <a:rPr lang="en-US" dirty="0"/>
               <a:pPr/>
-              <a:t>6/10/2021</a:t>
+              <a:t>6/15/2021</a:t>
             </a:fld>
             <a:endParaRPr lang="en-US" dirty="0"/>
           </a:p>
@@ -5489,104 +5496,6 @@
           <p:cNvPr id="2" name="Título 1">
             <a:extLst>
               <a:ext uri="{FF2B5EF4-FFF2-40B4-BE49-F238E27FC236}">
-                <a16:creationId xmlns:a16="http://schemas.microsoft.com/office/drawing/2014/main" id="{BE9C1640-3AFD-48FE-9341-BECD39956AF5}"/>
-              </a:ext>
-            </a:extLst>
-          </p:cNvPr>
-          <p:cNvSpPr>
-            <a:spLocks noGrp="1"/>
-          </p:cNvSpPr>
-          <p:nvPr>
-            <p:ph type="title"/>
-          </p:nvPr>
-        </p:nvSpPr>
-        <p:spPr/>
-        <p:txBody>
-          <a:bodyPr/>
-          <a:lstStyle/>
-          <a:p>
-            <a:pPr algn="ctr"/>
-            <a:r>
-              <a:rPr lang="es-ES" dirty="0"/>
-              <a:t>Modelo Relacional</a:t>
-            </a:r>
-          </a:p>
-        </p:txBody>
-      </p:sp>
-      <p:pic>
-        <p:nvPicPr>
-          <p:cNvPr id="6" name="Imagen 5">
-            <a:extLst>
-              <a:ext uri="{FF2B5EF4-FFF2-40B4-BE49-F238E27FC236}">
-                <a16:creationId xmlns:a16="http://schemas.microsoft.com/office/drawing/2014/main" id="{C92AA03F-8AD3-407F-B435-5CA4EEF4292C}"/>
-              </a:ext>
-            </a:extLst>
-          </p:cNvPr>
-          <p:cNvPicPr/>
-          <p:nvPr/>
-        </p:nvPicPr>
-        <p:blipFill>
-          <a:blip r:embed="rId2" cstate="print">
-            <a:extLst>
-              <a:ext uri="{28A0092B-C50C-407E-A947-70E740481C1C}">
-                <a14:useLocalDpi xmlns:a14="http://schemas.microsoft.com/office/drawing/2010/main" val="0"/>
-              </a:ext>
-            </a:extLst>
-          </a:blip>
-          <a:srcRect/>
-          <a:stretch>
-            <a:fillRect/>
-          </a:stretch>
-        </p:blipFill>
-        <p:spPr bwMode="auto">
-          <a:xfrm>
-            <a:off x="2106677" y="2212024"/>
-            <a:ext cx="7978646" cy="4198788"/>
-          </a:xfrm>
-          <a:prstGeom prst="rect">
-            <a:avLst/>
-          </a:prstGeom>
-          <a:noFill/>
-          <a:ln>
-            <a:noFill/>
-          </a:ln>
-        </p:spPr>
-      </p:pic>
-    </p:spTree>
-    <p:extLst>
-      <p:ext uri="{BB962C8B-B14F-4D97-AF65-F5344CB8AC3E}">
-        <p14:creationId xmlns:p14="http://schemas.microsoft.com/office/powerpoint/2010/main" val="3659172559"/>
-      </p:ext>
-    </p:extLst>
-  </p:cSld>
-  <p:clrMapOvr>
-    <a:masterClrMapping/>
-  </p:clrMapOvr>
-</p:sld>
-</file>
-
-<file path=ppt/slides/slide3.xml><?xml version="1.0" encoding="utf-8"?>
-<p:sld xmlns:a="http://schemas.openxmlformats.org/drawingml/2006/main" xmlns:r="http://schemas.openxmlformats.org/officeDocument/2006/relationships" xmlns:p="http://schemas.openxmlformats.org/presentationml/2006/main">
-  <p:cSld>
-    <p:spTree>
-      <p:nvGrpSpPr>
-        <p:cNvPr id="1" name=""/>
-        <p:cNvGrpSpPr/>
-        <p:nvPr/>
-      </p:nvGrpSpPr>
-      <p:grpSpPr>
-        <a:xfrm>
-          <a:off x="0" y="0"/>
-          <a:ext cx="0" cy="0"/>
-          <a:chOff x="0" y="0"/>
-          <a:chExt cx="0" cy="0"/>
-        </a:xfrm>
-      </p:grpSpPr>
-      <p:sp>
-        <p:nvSpPr>
-          <p:cNvPr id="2" name="Título 1">
-            <a:extLst>
-              <a:ext uri="{FF2B5EF4-FFF2-40B4-BE49-F238E27FC236}">
                 <a16:creationId xmlns:a16="http://schemas.microsoft.com/office/drawing/2014/main" id="{19ECAE40-FED5-4CE0-9AC6-BD932181CEB5}"/>
               </a:ext>
             </a:extLst>
@@ -5765,6 +5674,104 @@
 </p:sld>
 </file>
 
+<file path=ppt/slides/slide3.xml><?xml version="1.0" encoding="utf-8"?>
+<p:sld xmlns:a="http://schemas.openxmlformats.org/drawingml/2006/main" xmlns:r="http://schemas.openxmlformats.org/officeDocument/2006/relationships" xmlns:p="http://schemas.openxmlformats.org/presentationml/2006/main">
+  <p:cSld>
+    <p:spTree>
+      <p:nvGrpSpPr>
+        <p:cNvPr id="1" name=""/>
+        <p:cNvGrpSpPr/>
+        <p:nvPr/>
+      </p:nvGrpSpPr>
+      <p:grpSpPr>
+        <a:xfrm>
+          <a:off x="0" y="0"/>
+          <a:ext cx="0" cy="0"/>
+          <a:chOff x="0" y="0"/>
+          <a:chExt cx="0" cy="0"/>
+        </a:xfrm>
+      </p:grpSpPr>
+      <p:sp>
+        <p:nvSpPr>
+          <p:cNvPr id="2" name="Título 1">
+            <a:extLst>
+              <a:ext uri="{FF2B5EF4-FFF2-40B4-BE49-F238E27FC236}">
+                <a16:creationId xmlns:a16="http://schemas.microsoft.com/office/drawing/2014/main" id="{BE9C1640-3AFD-48FE-9341-BECD39956AF5}"/>
+              </a:ext>
+            </a:extLst>
+          </p:cNvPr>
+          <p:cNvSpPr>
+            <a:spLocks noGrp="1"/>
+          </p:cNvSpPr>
+          <p:nvPr>
+            <p:ph type="title"/>
+          </p:nvPr>
+        </p:nvSpPr>
+        <p:spPr/>
+        <p:txBody>
+          <a:bodyPr/>
+          <a:lstStyle/>
+          <a:p>
+            <a:pPr algn="ctr"/>
+            <a:r>
+              <a:rPr lang="es-ES" dirty="0"/>
+              <a:t>Modelo Relacional</a:t>
+            </a:r>
+          </a:p>
+        </p:txBody>
+      </p:sp>
+      <p:pic>
+        <p:nvPicPr>
+          <p:cNvPr id="6" name="Imagen 5">
+            <a:extLst>
+              <a:ext uri="{FF2B5EF4-FFF2-40B4-BE49-F238E27FC236}">
+                <a16:creationId xmlns:a16="http://schemas.microsoft.com/office/drawing/2014/main" id="{C92AA03F-8AD3-407F-B435-5CA4EEF4292C}"/>
+              </a:ext>
+            </a:extLst>
+          </p:cNvPr>
+          <p:cNvPicPr/>
+          <p:nvPr/>
+        </p:nvPicPr>
+        <p:blipFill>
+          <a:blip r:embed="rId2" cstate="print">
+            <a:extLst>
+              <a:ext uri="{28A0092B-C50C-407E-A947-70E740481C1C}">
+                <a14:useLocalDpi xmlns:a14="http://schemas.microsoft.com/office/drawing/2010/main" val="0"/>
+              </a:ext>
+            </a:extLst>
+          </a:blip>
+          <a:srcRect/>
+          <a:stretch>
+            <a:fillRect/>
+          </a:stretch>
+        </p:blipFill>
+        <p:spPr bwMode="auto">
+          <a:xfrm>
+            <a:off x="2106677" y="2212024"/>
+            <a:ext cx="7978646" cy="4198788"/>
+          </a:xfrm>
+          <a:prstGeom prst="rect">
+            <a:avLst/>
+          </a:prstGeom>
+          <a:noFill/>
+          <a:ln>
+            <a:noFill/>
+          </a:ln>
+        </p:spPr>
+      </p:pic>
+    </p:spTree>
+    <p:extLst>
+      <p:ext uri="{BB962C8B-B14F-4D97-AF65-F5344CB8AC3E}">
+        <p14:creationId xmlns:p14="http://schemas.microsoft.com/office/powerpoint/2010/main" val="3659172559"/>
+      </p:ext>
+    </p:extLst>
+  </p:cSld>
+  <p:clrMapOvr>
+    <a:masterClrMapping/>
+  </p:clrMapOvr>
+</p:sld>
+</file>
+
 <file path=ppt/slides/slide4.xml><?xml version="1.0" encoding="utf-8"?>
 <p:sld xmlns:a="http://schemas.openxmlformats.org/drawingml/2006/main" xmlns:r="http://schemas.openxmlformats.org/officeDocument/2006/relationships" xmlns:p="http://schemas.openxmlformats.org/presentationml/2006/main">
   <p:cSld>
@@ -5999,6 +6006,223 @@
           <p:cNvPr id="2" name="Título 1">
             <a:extLst>
               <a:ext uri="{FF2B5EF4-FFF2-40B4-BE49-F238E27FC236}">
+                <a16:creationId xmlns:a16="http://schemas.microsoft.com/office/drawing/2014/main" id="{2B8EFAFE-6680-4860-8A71-A25B32E29449}"/>
+              </a:ext>
+            </a:extLst>
+          </p:cNvPr>
+          <p:cNvSpPr>
+            <a:spLocks noGrp="1"/>
+          </p:cNvSpPr>
+          <p:nvPr>
+            <p:ph type="title"/>
+          </p:nvPr>
+        </p:nvSpPr>
+        <p:spPr>
+          <a:xfrm>
+            <a:off x="2726782" y="619739"/>
+            <a:ext cx="6738436" cy="554617"/>
+          </a:xfrm>
+        </p:spPr>
+        <p:txBody>
+          <a:bodyPr/>
+          <a:lstStyle/>
+          <a:p>
+            <a:pPr algn="ctr"/>
+            <a:r>
+              <a:rPr lang="es-ES" dirty="0"/>
+              <a:t>Buscador</a:t>
+            </a:r>
+          </a:p>
+        </p:txBody>
+      </p:sp>
+      <p:pic>
+        <p:nvPicPr>
+          <p:cNvPr id="1026" name="Picture 2">
+            <a:extLst>
+              <a:ext uri="{FF2B5EF4-FFF2-40B4-BE49-F238E27FC236}">
+                <a16:creationId xmlns:a16="http://schemas.microsoft.com/office/drawing/2014/main" id="{1C7DD0D8-247C-4814-AAD5-DA5BF9772811}"/>
+              </a:ext>
+            </a:extLst>
+          </p:cNvPr>
+          <p:cNvPicPr>
+            <a:picLocks noChangeAspect="1" noChangeArrowheads="1"/>
+          </p:cNvPicPr>
+          <p:nvPr/>
+        </p:nvPicPr>
+        <p:blipFill>
+          <a:blip r:embed="rId2">
+            <a:extLst>
+              <a:ext uri="{28A0092B-C50C-407E-A947-70E740481C1C}">
+                <a14:useLocalDpi xmlns:a14="http://schemas.microsoft.com/office/drawing/2010/main" val="0"/>
+              </a:ext>
+            </a:extLst>
+          </a:blip>
+          <a:srcRect/>
+          <a:stretch>
+            <a:fillRect/>
+          </a:stretch>
+        </p:blipFill>
+        <p:spPr bwMode="auto">
+          <a:xfrm>
+            <a:off x="2210499" y="2296910"/>
+            <a:ext cx="7771002" cy="4236613"/>
+          </a:xfrm>
+          <a:prstGeom prst="rect">
+            <a:avLst/>
+          </a:prstGeom>
+          <a:noFill/>
+          <a:extLst>
+            <a:ext uri="{909E8E84-426E-40DD-AFC4-6F175D3DCCD1}">
+              <a14:hiddenFill xmlns:a14="http://schemas.microsoft.com/office/drawing/2010/main">
+                <a:solidFill>
+                  <a:srgbClr val="FFFFFF"/>
+                </a:solidFill>
+              </a14:hiddenFill>
+            </a:ext>
+          </a:extLst>
+        </p:spPr>
+      </p:pic>
+    </p:spTree>
+    <p:extLst>
+      <p:ext uri="{BB962C8B-B14F-4D97-AF65-F5344CB8AC3E}">
+        <p14:creationId xmlns:p14="http://schemas.microsoft.com/office/powerpoint/2010/main" val="3098636883"/>
+      </p:ext>
+    </p:extLst>
+  </p:cSld>
+  <p:clrMapOvr>
+    <a:masterClrMapping/>
+  </p:clrMapOvr>
+</p:sld>
+</file>
+
+<file path=ppt/slides/slide7.xml><?xml version="1.0" encoding="utf-8"?>
+<p:sld xmlns:a="http://schemas.openxmlformats.org/drawingml/2006/main" xmlns:r="http://schemas.openxmlformats.org/officeDocument/2006/relationships" xmlns:p="http://schemas.openxmlformats.org/presentationml/2006/main">
+  <p:cSld>
+    <p:spTree>
+      <p:nvGrpSpPr>
+        <p:cNvPr id="1" name=""/>
+        <p:cNvGrpSpPr/>
+        <p:nvPr/>
+      </p:nvGrpSpPr>
+      <p:grpSpPr>
+        <a:xfrm>
+          <a:off x="0" y="0"/>
+          <a:ext cx="0" cy="0"/>
+          <a:chOff x="0" y="0"/>
+          <a:chExt cx="0" cy="0"/>
+        </a:xfrm>
+      </p:grpSpPr>
+      <p:sp>
+        <p:nvSpPr>
+          <p:cNvPr id="2" name="Título 1">
+            <a:extLst>
+              <a:ext uri="{FF2B5EF4-FFF2-40B4-BE49-F238E27FC236}">
+                <a16:creationId xmlns:a16="http://schemas.microsoft.com/office/drawing/2014/main" id="{4443E26C-7601-4CAE-927E-B0D73C4B637B}"/>
+              </a:ext>
+            </a:extLst>
+          </p:cNvPr>
+          <p:cNvSpPr>
+            <a:spLocks noGrp="1"/>
+          </p:cNvSpPr>
+          <p:nvPr>
+            <p:ph type="title"/>
+          </p:nvPr>
+        </p:nvSpPr>
+        <p:spPr/>
+        <p:txBody>
+          <a:bodyPr/>
+          <a:lstStyle/>
+          <a:p>
+            <a:pPr algn="ctr"/>
+            <a:r>
+              <a:rPr lang="es-ES" dirty="0"/>
+              <a:t>Página de información</a:t>
+            </a:r>
+          </a:p>
+        </p:txBody>
+      </p:sp>
+      <p:pic>
+        <p:nvPicPr>
+          <p:cNvPr id="2050" name="Picture 2">
+            <a:extLst>
+              <a:ext uri="{FF2B5EF4-FFF2-40B4-BE49-F238E27FC236}">
+                <a16:creationId xmlns:a16="http://schemas.microsoft.com/office/drawing/2014/main" id="{973A50BF-FC69-4A7A-B10A-8C1D8EF23A74}"/>
+              </a:ext>
+            </a:extLst>
+          </p:cNvPr>
+          <p:cNvPicPr>
+            <a:picLocks noChangeAspect="1" noChangeArrowheads="1"/>
+          </p:cNvPicPr>
+          <p:nvPr/>
+        </p:nvPicPr>
+        <p:blipFill>
+          <a:blip r:embed="rId2">
+            <a:extLst>
+              <a:ext uri="{28A0092B-C50C-407E-A947-70E740481C1C}">
+                <a14:useLocalDpi xmlns:a14="http://schemas.microsoft.com/office/drawing/2010/main" val="0"/>
+              </a:ext>
+            </a:extLst>
+          </a:blip>
+          <a:srcRect/>
+          <a:stretch>
+            <a:fillRect/>
+          </a:stretch>
+        </p:blipFill>
+        <p:spPr bwMode="auto">
+          <a:xfrm>
+            <a:off x="2139191" y="2274097"/>
+            <a:ext cx="7913615" cy="4330850"/>
+          </a:xfrm>
+          <a:prstGeom prst="rect">
+            <a:avLst/>
+          </a:prstGeom>
+          <a:noFill/>
+          <a:extLst>
+            <a:ext uri="{909E8E84-426E-40DD-AFC4-6F175D3DCCD1}">
+              <a14:hiddenFill xmlns:a14="http://schemas.microsoft.com/office/drawing/2010/main">
+                <a:solidFill>
+                  <a:srgbClr val="FFFFFF"/>
+                </a:solidFill>
+              </a14:hiddenFill>
+            </a:ext>
+          </a:extLst>
+        </p:spPr>
+      </p:pic>
+    </p:spTree>
+    <p:extLst>
+      <p:ext uri="{BB962C8B-B14F-4D97-AF65-F5344CB8AC3E}">
+        <p14:creationId xmlns:p14="http://schemas.microsoft.com/office/powerpoint/2010/main" val="1317146662"/>
+      </p:ext>
+    </p:extLst>
+  </p:cSld>
+  <p:clrMapOvr>
+    <a:masterClrMapping/>
+  </p:clrMapOvr>
+</p:sld>
+</file>
+
+<file path=ppt/slides/slide8.xml><?xml version="1.0" encoding="utf-8"?>
+<p:sld xmlns:a="http://schemas.openxmlformats.org/drawingml/2006/main" xmlns:r="http://schemas.openxmlformats.org/officeDocument/2006/relationships" xmlns:p="http://schemas.openxmlformats.org/presentationml/2006/main">
+  <p:cSld>
+    <p:spTree>
+      <p:nvGrpSpPr>
+        <p:cNvPr id="1" name=""/>
+        <p:cNvGrpSpPr/>
+        <p:nvPr/>
+      </p:nvGrpSpPr>
+      <p:grpSpPr>
+        <a:xfrm>
+          <a:off x="0" y="0"/>
+          <a:ext cx="0" cy="0"/>
+          <a:chOff x="0" y="0"/>
+          <a:chExt cx="0" cy="0"/>
+        </a:xfrm>
+      </p:grpSpPr>
+      <p:sp>
+        <p:nvSpPr>
+          <p:cNvPr id="2" name="Título 1">
+            <a:extLst>
+              <a:ext uri="{FF2B5EF4-FFF2-40B4-BE49-F238E27FC236}">
                 <a16:creationId xmlns:a16="http://schemas.microsoft.com/office/drawing/2014/main" id="{AA9743CD-FCD2-4F39-905F-9503E82BAD9E}"/>
               </a:ext>
             </a:extLst>
@@ -6083,7 +6307,7 @@
 </p:sld>
 </file>
 
-<file path=ppt/slides/slide7.xml><?xml version="1.0" encoding="utf-8"?>
+<file path=ppt/slides/slide9.xml><?xml version="1.0" encoding="utf-8"?>
 <p:sld xmlns:a="http://schemas.openxmlformats.org/drawingml/2006/main" xmlns:r="http://schemas.openxmlformats.org/officeDocument/2006/relationships" xmlns:p="http://schemas.openxmlformats.org/presentationml/2006/main">
   <p:cSld>
     <p:spTree>

</xml_diff>